<commit_message>
Bridging semantics and syntax with graph algorithm6
</commit_message>
<xml_diff>
--- a/Review/Brief Bioinform_2016_Luo_Bridging semantics and syntax with graph algorithm/Bridging semantics and syntax with graph2.pptx
+++ b/Review/Brief Bioinform_2016_Luo_Bridging semantics and syntax with graph algorithm/Bridging semantics and syntax with graph2.pptx
@@ -217,7 +217,7 @@
           <a:p>
             <a:fld id="{7E79EB56-44A1-46CE-8B6B-9528BA84A8D9}" type="datetimeFigureOut">
               <a:rPr lang="ko-KR" altLang="en-US" smtClean="0"/>
-              <a:t>2016-08-01</a:t>
+              <a:t>2016-08-03</a:t>
             </a:fld>
             <a:endParaRPr lang="ko-KR" altLang="en-US"/>
           </a:p>
@@ -431,7 +431,7 @@
           <a:p>
             <a:fld id="{83EDC4C0-6A02-4D45-A5CC-78FAE8BE5E20}" type="datetimeFigureOut">
               <a:rPr lang="ko-KR" altLang="en-US" smtClean="0"/>
-              <a:t>2016-08-01</a:t>
+              <a:t>2016-08-03</a:t>
             </a:fld>
             <a:endParaRPr lang="ko-KR" altLang="en-US"/>
           </a:p>
@@ -601,7 +601,7 @@
           <a:p>
             <a:fld id="{83EDC4C0-6A02-4D45-A5CC-78FAE8BE5E20}" type="datetimeFigureOut">
               <a:rPr lang="ko-KR" altLang="en-US" smtClean="0"/>
-              <a:t>2016-08-01</a:t>
+              <a:t>2016-08-03</a:t>
             </a:fld>
             <a:endParaRPr lang="ko-KR" altLang="en-US"/>
           </a:p>
@@ -781,7 +781,7 @@
           <a:p>
             <a:fld id="{83EDC4C0-6A02-4D45-A5CC-78FAE8BE5E20}" type="datetimeFigureOut">
               <a:rPr lang="ko-KR" altLang="en-US" smtClean="0"/>
-              <a:t>2016-08-01</a:t>
+              <a:t>2016-08-03</a:t>
             </a:fld>
             <a:endParaRPr lang="ko-KR" altLang="en-US"/>
           </a:p>
@@ -951,7 +951,7 @@
           <a:p>
             <a:fld id="{83EDC4C0-6A02-4D45-A5CC-78FAE8BE5E20}" type="datetimeFigureOut">
               <a:rPr lang="ko-KR" altLang="en-US" smtClean="0"/>
-              <a:t>2016-08-01</a:t>
+              <a:t>2016-08-03</a:t>
             </a:fld>
             <a:endParaRPr lang="ko-KR" altLang="en-US"/>
           </a:p>
@@ -1197,7 +1197,7 @@
           <a:p>
             <a:fld id="{83EDC4C0-6A02-4D45-A5CC-78FAE8BE5E20}" type="datetimeFigureOut">
               <a:rPr lang="ko-KR" altLang="en-US" smtClean="0"/>
-              <a:t>2016-08-01</a:t>
+              <a:t>2016-08-03</a:t>
             </a:fld>
             <a:endParaRPr lang="ko-KR" altLang="en-US"/>
           </a:p>
@@ -1429,7 +1429,7 @@
           <a:p>
             <a:fld id="{83EDC4C0-6A02-4D45-A5CC-78FAE8BE5E20}" type="datetimeFigureOut">
               <a:rPr lang="ko-KR" altLang="en-US" smtClean="0"/>
-              <a:t>2016-08-01</a:t>
+              <a:t>2016-08-03</a:t>
             </a:fld>
             <a:endParaRPr lang="ko-KR" altLang="en-US"/>
           </a:p>
@@ -1796,7 +1796,7 @@
           <a:p>
             <a:fld id="{83EDC4C0-6A02-4D45-A5CC-78FAE8BE5E20}" type="datetimeFigureOut">
               <a:rPr lang="ko-KR" altLang="en-US" smtClean="0"/>
-              <a:t>2016-08-01</a:t>
+              <a:t>2016-08-03</a:t>
             </a:fld>
             <a:endParaRPr lang="ko-KR" altLang="en-US"/>
           </a:p>
@@ -1914,7 +1914,7 @@
           <a:p>
             <a:fld id="{83EDC4C0-6A02-4D45-A5CC-78FAE8BE5E20}" type="datetimeFigureOut">
               <a:rPr lang="ko-KR" altLang="en-US" smtClean="0"/>
-              <a:t>2016-08-01</a:t>
+              <a:t>2016-08-03</a:t>
             </a:fld>
             <a:endParaRPr lang="ko-KR" altLang="en-US"/>
           </a:p>
@@ -2009,7 +2009,7 @@
           <a:p>
             <a:fld id="{83EDC4C0-6A02-4D45-A5CC-78FAE8BE5E20}" type="datetimeFigureOut">
               <a:rPr lang="ko-KR" altLang="en-US" smtClean="0"/>
-              <a:t>2016-08-01</a:t>
+              <a:t>2016-08-03</a:t>
             </a:fld>
             <a:endParaRPr lang="ko-KR" altLang="en-US"/>
           </a:p>
@@ -2286,7 +2286,7 @@
           <a:p>
             <a:fld id="{83EDC4C0-6A02-4D45-A5CC-78FAE8BE5E20}" type="datetimeFigureOut">
               <a:rPr lang="ko-KR" altLang="en-US" smtClean="0"/>
-              <a:t>2016-08-01</a:t>
+              <a:t>2016-08-03</a:t>
             </a:fld>
             <a:endParaRPr lang="ko-KR" altLang="en-US"/>
           </a:p>
@@ -2539,7 +2539,7 @@
           <a:p>
             <a:fld id="{83EDC4C0-6A02-4D45-A5CC-78FAE8BE5E20}" type="datetimeFigureOut">
               <a:rPr lang="ko-KR" altLang="en-US" smtClean="0"/>
-              <a:t>2016-08-01</a:t>
+              <a:t>2016-08-03</a:t>
             </a:fld>
             <a:endParaRPr lang="ko-KR" altLang="en-US"/>
           </a:p>
@@ -2752,7 +2752,7 @@
           <a:p>
             <a:fld id="{83EDC4C0-6A02-4D45-A5CC-78FAE8BE5E20}" type="datetimeFigureOut">
               <a:rPr lang="ko-KR" altLang="en-US" smtClean="0"/>
-              <a:t>2016-08-01</a:t>
+              <a:t>2016-08-03</a:t>
             </a:fld>
             <a:endParaRPr lang="ko-KR" altLang="en-US"/>
           </a:p>
@@ -3389,7 +3389,6 @@
               <a:rPr lang="en-US" altLang="ko-KR" dirty="0"/>
               <a:t>graph-based features to various extents.</a:t>
             </a:r>
-            <a:endParaRPr lang="en-US" altLang="ko-KR" dirty="0"/>
           </a:p>
           <a:p>
             <a:endParaRPr lang="en-US" altLang="ko-KR" dirty="0" smtClean="0"/>
@@ -3407,7 +3406,6 @@
               <a:rPr lang="en-US" altLang="ko-KR" dirty="0" smtClean="0"/>
               <a:t>.</a:t>
             </a:r>
-            <a:endParaRPr lang="en-US" altLang="ko-KR" dirty="0" smtClean="0"/>
           </a:p>
           <a:p>
             <a:pPr lvl="1"/>
@@ -3802,7 +3800,6 @@
               <a:rPr lang="en-US" altLang="ko-KR" dirty="0" smtClean="0"/>
               <a:t>al.</a:t>
             </a:r>
-            <a:endParaRPr lang="en-US" altLang="ko-KR" dirty="0" smtClean="0"/>
           </a:p>
           <a:p>
             <a:pPr lvl="1"/>
@@ -5158,7 +5155,6 @@
               <a:rPr lang="en-US" altLang="ko-KR" dirty="0"/>
               <a:t>that:</a:t>
             </a:r>
-            <a:endParaRPr lang="en-US" altLang="ko-KR" dirty="0"/>
           </a:p>
           <a:p>
             <a:pPr lvl="1"/>
@@ -7050,7 +7046,6 @@
               <a:rPr lang="en-US" altLang="ko-KR" dirty="0" smtClean="0"/>
               <a:t>Some directly parse graph representation of relations from sentences by integrating the graph structure into the learning objective of the parsers.</a:t>
             </a:r>
-            <a:endParaRPr lang="en-US" altLang="ko-KR" dirty="0" smtClean="0"/>
           </a:p>
           <a:p>
             <a:pPr lvl="1"/>
@@ -7400,7 +7395,6 @@
               <a:rPr lang="en-US" altLang="ko-KR" dirty="0"/>
               <a:t>to assess and advance NLP techniques.</a:t>
             </a:r>
-            <a:endParaRPr lang="en-US" altLang="ko-KR" dirty="0"/>
           </a:p>
           <a:p>
             <a:endParaRPr lang="en-US" altLang="ko-KR" dirty="0" smtClean="0"/>

</xml_diff>